<commit_message>
docs: update diagrams and images
We are in the third and final refactoring phase of morphing
`persons`-oriented Address Book application to a `modules`-oriented
Degree Planner application.

In this third phase of refactoring, let's update all the diagrams and
images shown in the Developer Guide to replace all `*person*` with
`*module*`.
</commit_message>
<xml_diff>
--- a/docs/diagrams/ArchitectureDiagram.pptx
+++ b/docs/diagrams/ArchitectureDiagram.pptx
@@ -10,7 +10,7 @@
   <p:sldIdLst>
     <p:sldId id="259" r:id="rId2"/>
   </p:sldIdLst>
-  <p:sldSz cx="9144000" cy="6858000" type="screen4x3"/>
+  <p:sldSz cx="12192000" cy="6858000"/>
   <p:notesSz cx="6858000" cy="9144000"/>
   <p:defaultTextStyle>
     <a:defPPr>
@@ -110,12 +110,12 @@
   <p:extLst>
     <p:ext uri="{EFAFB233-063F-42B5-8137-9DF3F51BA10A}">
       <p15:sldGuideLst xmlns:p15="http://schemas.microsoft.com/office/powerpoint/2012/main">
-        <p15:guide id="1" orient="horz" pos="1488">
+        <p15:guide id="1" orient="horz" pos="1488" userDrawn="1">
           <p15:clr>
             <a:srgbClr val="A4A3A4"/>
           </p15:clr>
         </p15:guide>
-        <p15:guide id="2" pos="2880">
+        <p15:guide id="2" pos="3840" userDrawn="1">
           <p15:clr>
             <a:srgbClr val="A4A3A4"/>
           </p15:clr>
@@ -208,7 +208,7 @@
           <a:p>
             <a:fld id="{F5CC4B3F-88C1-4FFA-B1B6-F41C21DC6924}" type="datetimeFigureOut">
               <a:rPr lang="en-US" smtClean="0"/>
-              <a:t>12/15/2018</a:t>
+              <a:t>2/26/2019</a:t>
             </a:fld>
             <a:endParaRPr lang="en-US"/>
           </a:p>
@@ -226,8 +226,8 @@
         </p:nvSpPr>
         <p:spPr>
           <a:xfrm>
-            <a:off x="1143000" y="685800"/>
-            <a:ext cx="4572000" cy="3429000"/>
+            <a:off x="381000" y="685800"/>
+            <a:ext cx="6096000" cy="3429000"/>
           </a:xfrm>
           <a:prstGeom prst="rect">
             <a:avLst/>
@@ -504,8 +504,8 @@
         </p:nvSpPr>
         <p:spPr>
           <a:xfrm>
-            <a:off x="685800" y="2130425"/>
-            <a:ext cx="7772400" cy="1470025"/>
+            <a:off x="914400" y="2130428"/>
+            <a:ext cx="10363200" cy="1470025"/>
           </a:xfrm>
         </p:spPr>
         <p:txBody>
@@ -531,8 +531,8 @@
         </p:nvSpPr>
         <p:spPr>
           <a:xfrm>
-            <a:off x="1371600" y="3886200"/>
-            <a:ext cx="6400800" cy="1752600"/>
+            <a:off x="1828800" y="3886200"/>
+            <a:ext cx="8534400" cy="1752600"/>
           </a:xfrm>
         </p:spPr>
         <p:txBody>
@@ -654,7 +654,7 @@
           <a:p>
             <a:fld id="{78C97017-6FC3-485B-9764-EAC9E56C1D49}" type="datetimeFigureOut">
               <a:rPr lang="en-US" smtClean="0"/>
-              <a:t>12/15/2018</a:t>
+              <a:t>2/26/2019</a:t>
             </a:fld>
             <a:endParaRPr lang="en-US"/>
           </a:p>
@@ -822,7 +822,7 @@
           <a:p>
             <a:fld id="{78C97017-6FC3-485B-9764-EAC9E56C1D49}" type="datetimeFigureOut">
               <a:rPr lang="en-US" smtClean="0"/>
-              <a:t>12/15/2018</a:t>
+              <a:t>2/26/2019</a:t>
             </a:fld>
             <a:endParaRPr lang="en-US"/>
           </a:p>
@@ -912,8 +912,8 @@
         </p:nvSpPr>
         <p:spPr>
           <a:xfrm>
-            <a:off x="6629400" y="274638"/>
-            <a:ext cx="2057400" cy="5851525"/>
+            <a:off x="8839200" y="274641"/>
+            <a:ext cx="2743200" cy="5851525"/>
           </a:xfrm>
         </p:spPr>
         <p:txBody>
@@ -939,8 +939,8 @@
         </p:nvSpPr>
         <p:spPr>
           <a:xfrm>
-            <a:off x="457200" y="274638"/>
-            <a:ext cx="6019800" cy="5851525"/>
+            <a:off x="609600" y="274641"/>
+            <a:ext cx="8026400" cy="5851525"/>
           </a:xfrm>
         </p:spPr>
         <p:txBody>
@@ -1000,7 +1000,7 @@
           <a:p>
             <a:fld id="{78C97017-6FC3-485B-9764-EAC9E56C1D49}" type="datetimeFigureOut">
               <a:rPr lang="en-US" smtClean="0"/>
-              <a:t>12/15/2018</a:t>
+              <a:t>2/26/2019</a:t>
             </a:fld>
             <a:endParaRPr lang="en-US"/>
           </a:p>
@@ -1168,7 +1168,7 @@
           <a:p>
             <a:fld id="{78C97017-6FC3-485B-9764-EAC9E56C1D49}" type="datetimeFigureOut">
               <a:rPr lang="en-US" smtClean="0"/>
-              <a:t>12/15/2018</a:t>
+              <a:t>2/26/2019</a:t>
             </a:fld>
             <a:endParaRPr lang="en-US"/>
           </a:p>
@@ -1258,8 +1258,8 @@
         </p:nvSpPr>
         <p:spPr>
           <a:xfrm>
-            <a:off x="722313" y="4406900"/>
-            <a:ext cx="7772400" cy="1362075"/>
+            <a:off x="963084" y="4406903"/>
+            <a:ext cx="10363200" cy="1362075"/>
           </a:xfrm>
         </p:spPr>
         <p:txBody>
@@ -1289,8 +1289,8 @@
         </p:nvSpPr>
         <p:spPr>
           <a:xfrm>
-            <a:off x="722313" y="2906713"/>
-            <a:ext cx="7772400" cy="1500187"/>
+            <a:off x="963084" y="2906713"/>
+            <a:ext cx="10363200" cy="1500187"/>
           </a:xfrm>
         </p:spPr>
         <p:txBody>
@@ -1413,7 +1413,7 @@
           <a:p>
             <a:fld id="{78C97017-6FC3-485B-9764-EAC9E56C1D49}" type="datetimeFigureOut">
               <a:rPr lang="en-US" smtClean="0"/>
-              <a:t>12/15/2018</a:t>
+              <a:t>2/26/2019</a:t>
             </a:fld>
             <a:endParaRPr lang="en-US"/>
           </a:p>
@@ -1525,8 +1525,8 @@
         </p:nvSpPr>
         <p:spPr>
           <a:xfrm>
-            <a:off x="457200" y="1600200"/>
-            <a:ext cx="4038600" cy="4525963"/>
+            <a:off x="609600" y="1600203"/>
+            <a:ext cx="5384800" cy="4525963"/>
           </a:xfrm>
         </p:spPr>
         <p:txBody>
@@ -1609,8 +1609,8 @@
         </p:nvSpPr>
         <p:spPr>
           <a:xfrm>
-            <a:off x="4648200" y="1600200"/>
-            <a:ext cx="4038600" cy="4525963"/>
+            <a:off x="6197600" y="1600203"/>
+            <a:ext cx="5384800" cy="4525963"/>
           </a:xfrm>
         </p:spPr>
         <p:txBody>
@@ -1698,7 +1698,7 @@
           <a:p>
             <a:fld id="{78C97017-6FC3-485B-9764-EAC9E56C1D49}" type="datetimeFigureOut">
               <a:rPr lang="en-US" smtClean="0"/>
-              <a:t>12/15/2018</a:t>
+              <a:t>2/26/2019</a:t>
             </a:fld>
             <a:endParaRPr lang="en-US"/>
           </a:p>
@@ -1814,8 +1814,8 @@
         </p:nvSpPr>
         <p:spPr>
           <a:xfrm>
-            <a:off x="457200" y="1535113"/>
-            <a:ext cx="4040188" cy="639762"/>
+            <a:off x="609600" y="1535113"/>
+            <a:ext cx="5386917" cy="639762"/>
           </a:xfrm>
         </p:spPr>
         <p:txBody>
@@ -1879,8 +1879,8 @@
         </p:nvSpPr>
         <p:spPr>
           <a:xfrm>
-            <a:off x="457200" y="2174875"/>
-            <a:ext cx="4040188" cy="3951288"/>
+            <a:off x="609600" y="2174875"/>
+            <a:ext cx="5386917" cy="3951288"/>
           </a:xfrm>
         </p:spPr>
         <p:txBody>
@@ -1963,8 +1963,8 @@
         </p:nvSpPr>
         <p:spPr>
           <a:xfrm>
-            <a:off x="4645025" y="1535113"/>
-            <a:ext cx="4041775" cy="639762"/>
+            <a:off x="6193369" y="1535113"/>
+            <a:ext cx="5389033" cy="639762"/>
           </a:xfrm>
         </p:spPr>
         <p:txBody>
@@ -2028,8 +2028,8 @@
         </p:nvSpPr>
         <p:spPr>
           <a:xfrm>
-            <a:off x="4645025" y="2174875"/>
-            <a:ext cx="4041775" cy="3951288"/>
+            <a:off x="6193369" y="2174875"/>
+            <a:ext cx="5389033" cy="3951288"/>
           </a:xfrm>
         </p:spPr>
         <p:txBody>
@@ -2117,7 +2117,7 @@
           <a:p>
             <a:fld id="{78C97017-6FC3-485B-9764-EAC9E56C1D49}" type="datetimeFigureOut">
               <a:rPr lang="en-US" smtClean="0"/>
-              <a:t>12/15/2018</a:t>
+              <a:t>2/26/2019</a:t>
             </a:fld>
             <a:endParaRPr lang="en-US"/>
           </a:p>
@@ -2234,7 +2234,7 @@
           <a:p>
             <a:fld id="{78C97017-6FC3-485B-9764-EAC9E56C1D49}" type="datetimeFigureOut">
               <a:rPr lang="en-US" smtClean="0"/>
-              <a:t>12/15/2018</a:t>
+              <a:t>2/26/2019</a:t>
             </a:fld>
             <a:endParaRPr lang="en-US"/>
           </a:p>
@@ -2329,7 +2329,7 @@
           <a:p>
             <a:fld id="{78C97017-6FC3-485B-9764-EAC9E56C1D49}" type="datetimeFigureOut">
               <a:rPr lang="en-US" smtClean="0"/>
-              <a:t>12/15/2018</a:t>
+              <a:t>2/26/2019</a:t>
             </a:fld>
             <a:endParaRPr lang="en-US"/>
           </a:p>
@@ -2419,8 +2419,8 @@
         </p:nvSpPr>
         <p:spPr>
           <a:xfrm>
-            <a:off x="457200" y="273050"/>
-            <a:ext cx="3008313" cy="1162050"/>
+            <a:off x="609601" y="273050"/>
+            <a:ext cx="4011084" cy="1162050"/>
           </a:xfrm>
         </p:spPr>
         <p:txBody>
@@ -2450,8 +2450,8 @@
         </p:nvSpPr>
         <p:spPr>
           <a:xfrm>
-            <a:off x="3575050" y="273050"/>
-            <a:ext cx="5111750" cy="5853113"/>
+            <a:off x="4766734" y="273053"/>
+            <a:ext cx="6815666" cy="5853113"/>
           </a:xfrm>
         </p:spPr>
         <p:txBody>
@@ -2534,8 +2534,8 @@
         </p:nvSpPr>
         <p:spPr>
           <a:xfrm>
-            <a:off x="457200" y="1435100"/>
-            <a:ext cx="3008313" cy="4691063"/>
+            <a:off x="609601" y="1435103"/>
+            <a:ext cx="4011084" cy="4691063"/>
           </a:xfrm>
         </p:spPr>
         <p:txBody>
@@ -2604,7 +2604,7 @@
           <a:p>
             <a:fld id="{78C97017-6FC3-485B-9764-EAC9E56C1D49}" type="datetimeFigureOut">
               <a:rPr lang="en-US" smtClean="0"/>
-              <a:t>12/15/2018</a:t>
+              <a:t>2/26/2019</a:t>
             </a:fld>
             <a:endParaRPr lang="en-US"/>
           </a:p>
@@ -2694,8 +2694,8 @@
         </p:nvSpPr>
         <p:spPr>
           <a:xfrm>
-            <a:off x="1792288" y="4800600"/>
-            <a:ext cx="5486400" cy="566738"/>
+            <a:off x="2389717" y="4800600"/>
+            <a:ext cx="7315200" cy="566738"/>
           </a:xfrm>
         </p:spPr>
         <p:txBody>
@@ -2725,8 +2725,8 @@
         </p:nvSpPr>
         <p:spPr>
           <a:xfrm>
-            <a:off x="1792288" y="612775"/>
-            <a:ext cx="5486400" cy="4114800"/>
+            <a:off x="2389717" y="612775"/>
+            <a:ext cx="7315200" cy="4114800"/>
           </a:xfrm>
         </p:spPr>
         <p:txBody>
@@ -2786,8 +2786,8 @@
         </p:nvSpPr>
         <p:spPr>
           <a:xfrm>
-            <a:off x="1792288" y="5367338"/>
-            <a:ext cx="5486400" cy="804862"/>
+            <a:off x="2389717" y="5367338"/>
+            <a:ext cx="7315200" cy="804862"/>
           </a:xfrm>
         </p:spPr>
         <p:txBody>
@@ -2856,7 +2856,7 @@
           <a:p>
             <a:fld id="{78C97017-6FC3-485B-9764-EAC9E56C1D49}" type="datetimeFigureOut">
               <a:rPr lang="en-US" smtClean="0"/>
-              <a:t>12/15/2018</a:t>
+              <a:t>2/26/2019</a:t>
             </a:fld>
             <a:endParaRPr lang="en-US"/>
           </a:p>
@@ -2951,8 +2951,8 @@
         </p:nvSpPr>
         <p:spPr>
           <a:xfrm>
-            <a:off x="457200" y="274638"/>
-            <a:ext cx="8229600" cy="1143000"/>
+            <a:off x="609600" y="274638"/>
+            <a:ext cx="10972800" cy="1143000"/>
           </a:xfrm>
           <a:prstGeom prst="rect">
             <a:avLst/>
@@ -2983,8 +2983,8 @@
         </p:nvSpPr>
         <p:spPr>
           <a:xfrm>
-            <a:off x="457200" y="1600200"/>
-            <a:ext cx="8229600" cy="4525963"/>
+            <a:off x="609600" y="1600203"/>
+            <a:ext cx="10972800" cy="4525963"/>
           </a:xfrm>
           <a:prstGeom prst="rect">
             <a:avLst/>
@@ -3044,8 +3044,8 @@
         </p:nvSpPr>
         <p:spPr>
           <a:xfrm>
-            <a:off x="457200" y="6356350"/>
-            <a:ext cx="2133600" cy="365125"/>
+            <a:off x="609600" y="6356353"/>
+            <a:ext cx="2844800" cy="365125"/>
           </a:xfrm>
           <a:prstGeom prst="rect">
             <a:avLst/>
@@ -3067,7 +3067,7 @@
           <a:p>
             <a:fld id="{78C97017-6FC3-485B-9764-EAC9E56C1D49}" type="datetimeFigureOut">
               <a:rPr lang="en-US" smtClean="0"/>
-              <a:t>12/15/2018</a:t>
+              <a:t>2/26/2019</a:t>
             </a:fld>
             <a:endParaRPr lang="en-US"/>
           </a:p>
@@ -3085,8 +3085,8 @@
         </p:nvSpPr>
         <p:spPr>
           <a:xfrm>
-            <a:off x="3124200" y="6356350"/>
-            <a:ext cx="2895600" cy="365125"/>
+            <a:off x="4165600" y="6356353"/>
+            <a:ext cx="3860800" cy="365125"/>
           </a:xfrm>
           <a:prstGeom prst="rect">
             <a:avLst/>
@@ -3122,8 +3122,8 @@
         </p:nvSpPr>
         <p:spPr>
           <a:xfrm>
-            <a:off x="6553200" y="6356350"/>
-            <a:ext cx="2133600" cy="365125"/>
+            <a:off x="8737600" y="6356353"/>
+            <a:ext cx="2844800" cy="365125"/>
           </a:xfrm>
           <a:prstGeom prst="rect">
             <a:avLst/>
@@ -3442,1229 +3442,1250 @@
           <a:chExt cx="0" cy="0"/>
         </a:xfrm>
       </p:grpSpPr>
-      <p:sp>
-        <p:nvSpPr>
-          <p:cNvPr id="15" name="Rounded Rectangle 14"/>
-          <p:cNvSpPr/>
+      <p:grpSp>
+        <p:nvGrpSpPr>
+          <p:cNvPr id="6" name="Group 5">
+            <a:extLst>
+              <a:ext uri="{FF2B5EF4-FFF2-40B4-BE49-F238E27FC236}">
+                <a16:creationId xmlns:a16="http://schemas.microsoft.com/office/drawing/2014/main" id="{78B495E1-72A1-4CBE-8A61-B8160139D8CB}"/>
+              </a:ext>
+            </a:extLst>
+          </p:cNvPr>
+          <p:cNvGrpSpPr/>
           <p:nvPr/>
-        </p:nvSpPr>
-        <p:spPr>
+        </p:nvGrpSpPr>
+        <p:grpSpPr>
           <a:xfrm>
-            <a:off x="1636188" y="2057400"/>
-            <a:ext cx="5700181" cy="2667000"/>
+            <a:off x="2726272" y="1447800"/>
+            <a:ext cx="6951131" cy="3276600"/>
+            <a:chOff x="1202269" y="1447800"/>
+            <a:chExt cx="6951131" cy="3276600"/>
           </a:xfrm>
-          <a:prstGeom prst="roundRect">
-            <a:avLst>
-              <a:gd name="adj" fmla="val 5768"/>
-            </a:avLst>
-          </a:prstGeom>
-          <a:solidFill>
-            <a:schemeClr val="bg1">
-              <a:lumMod val="95000"/>
-            </a:schemeClr>
-          </a:solidFill>
-          <a:ln>
+        </p:grpSpPr>
+        <p:sp>
+          <p:nvSpPr>
+            <p:cNvPr id="15" name="Rounded Rectangle 14"/>
+            <p:cNvSpPr/>
+            <p:nvPr/>
+          </p:nvSpPr>
+          <p:spPr>
+            <a:xfrm>
+              <a:off x="1636188" y="2057400"/>
+              <a:ext cx="5700181" cy="2667000"/>
+            </a:xfrm>
+            <a:prstGeom prst="roundRect">
+              <a:avLst>
+                <a:gd name="adj" fmla="val 5768"/>
+              </a:avLst>
+            </a:prstGeom>
             <a:solidFill>
               <a:schemeClr val="bg1">
-                <a:lumMod val="85000"/>
+                <a:lumMod val="95000"/>
               </a:schemeClr>
             </a:solidFill>
-          </a:ln>
-        </p:spPr>
-        <p:style>
-          <a:lnRef idx="2">
-            <a:schemeClr val="accent1">
-              <a:shade val="50000"/>
-            </a:schemeClr>
-          </a:lnRef>
-          <a:fillRef idx="1">
-            <a:schemeClr val="accent1"/>
-          </a:fillRef>
-          <a:effectRef idx="0">
-            <a:schemeClr val="accent1"/>
-          </a:effectRef>
-          <a:fontRef idx="minor">
-            <a:schemeClr val="lt1"/>
-          </a:fontRef>
-        </p:style>
-        <p:txBody>
-          <a:bodyPr rtlCol="0" anchor="ctr"/>
-          <a:lstStyle/>
-          <a:p>
-            <a:pPr algn="ctr"/>
-            <a:endParaRPr lang="en-US" dirty="0"/>
-          </a:p>
-        </p:txBody>
-      </p:sp>
-      <p:sp>
-        <p:nvSpPr>
-          <p:cNvPr id="2" name="Rectangle 62"/>
-          <p:cNvSpPr/>
-          <p:nvPr/>
-        </p:nvSpPr>
-        <p:spPr>
-          <a:xfrm flipH="1">
-            <a:off x="1964269" y="2191178"/>
-            <a:ext cx="609602" cy="1294917"/>
-          </a:xfrm>
-          <a:prstGeom prst="roundRect">
-            <a:avLst/>
-          </a:prstGeom>
-          <a:solidFill>
-            <a:srgbClr val="00B050"/>
-          </a:solidFill>
-          <a:ln w="19050">
+            <a:ln>
+              <a:solidFill>
+                <a:schemeClr val="bg1">
+                  <a:lumMod val="85000"/>
+                </a:schemeClr>
+              </a:solidFill>
+            </a:ln>
+          </p:spPr>
+          <p:style>
+            <a:lnRef idx="2">
+              <a:schemeClr val="accent1">
+                <a:shade val="50000"/>
+              </a:schemeClr>
+            </a:lnRef>
+            <a:fillRef idx="1">
+              <a:schemeClr val="accent1"/>
+            </a:fillRef>
+            <a:effectRef idx="0">
+              <a:schemeClr val="accent1"/>
+            </a:effectRef>
+            <a:fontRef idx="minor">
+              <a:schemeClr val="lt1"/>
+            </a:fontRef>
+          </p:style>
+          <p:txBody>
+            <a:bodyPr rtlCol="0" anchor="ctr"/>
+            <a:lstStyle/>
+            <a:p>
+              <a:pPr algn="ctr"/>
+              <a:endParaRPr lang="en-US" dirty="0"/>
+            </a:p>
+          </p:txBody>
+        </p:sp>
+        <p:sp>
+          <p:nvSpPr>
+            <p:cNvPr id="2" name="Rectangle 62"/>
+            <p:cNvSpPr/>
+            <p:nvPr/>
+          </p:nvSpPr>
+          <p:spPr>
+            <a:xfrm flipH="1">
+              <a:off x="1964269" y="2191178"/>
+              <a:ext cx="609602" cy="1294917"/>
+            </a:xfrm>
+            <a:prstGeom prst="roundRect">
+              <a:avLst/>
+            </a:prstGeom>
             <a:solidFill>
               <a:srgbClr val="00B050"/>
             </a:solidFill>
-          </a:ln>
-          <a:effectLst/>
-        </p:spPr>
-        <p:style>
-          <a:lnRef idx="1">
-            <a:schemeClr val="accent2"/>
-          </a:lnRef>
-          <a:fillRef idx="2">
-            <a:schemeClr val="accent2"/>
-          </a:fillRef>
-          <a:effectRef idx="1">
-            <a:schemeClr val="accent2"/>
-          </a:effectRef>
-          <a:fontRef idx="minor">
-            <a:schemeClr val="dk1"/>
-          </a:fontRef>
-        </p:style>
-        <p:txBody>
-          <a:bodyPr rtlCol="0" anchor="ctr"/>
-          <a:lstStyle/>
-          <a:p>
-            <a:pPr algn="ctr"/>
-            <a:r>
-              <a:rPr lang="en-US" sz="1600" dirty="0">
+            <a:ln w="19050">
+              <a:solidFill>
+                <a:srgbClr val="00B050"/>
+              </a:solidFill>
+            </a:ln>
+            <a:effectLst/>
+          </p:spPr>
+          <p:style>
+            <a:lnRef idx="1">
+              <a:schemeClr val="accent2"/>
+            </a:lnRef>
+            <a:fillRef idx="2">
+              <a:schemeClr val="accent2"/>
+            </a:fillRef>
+            <a:effectRef idx="1">
+              <a:schemeClr val="accent2"/>
+            </a:effectRef>
+            <a:fontRef idx="minor">
+              <a:schemeClr val="dk1"/>
+            </a:fontRef>
+          </p:style>
+          <p:txBody>
+            <a:bodyPr rtlCol="0" anchor="ctr"/>
+            <a:lstStyle/>
+            <a:p>
+              <a:pPr algn="ctr"/>
+              <a:r>
+                <a:rPr lang="en-US" sz="1600" dirty="0">
+                  <a:solidFill>
+                    <a:schemeClr val="bg1"/>
+                  </a:solidFill>
+                </a:rPr>
+                <a:t>UI</a:t>
+              </a:r>
+              <a:endParaRPr lang="en-SG" sz="1600" dirty="0">
                 <a:solidFill>
                   <a:schemeClr val="bg1"/>
                 </a:solidFill>
-              </a:rPr>
-              <a:t>UI</a:t>
-            </a:r>
-            <a:endParaRPr lang="en-SG" sz="1600" dirty="0">
-              <a:solidFill>
-                <a:schemeClr val="bg1"/>
-              </a:solidFill>
-            </a:endParaRPr>
-          </a:p>
-        </p:txBody>
-      </p:sp>
-      <p:sp>
-        <p:nvSpPr>
-          <p:cNvPr id="3" name="Rectangle 45"/>
-          <p:cNvSpPr/>
-          <p:nvPr/>
-        </p:nvSpPr>
-        <p:spPr>
-          <a:xfrm>
-            <a:off x="3412069" y="2191178"/>
-            <a:ext cx="1295400" cy="552022"/>
-          </a:xfrm>
-          <a:prstGeom prst="roundRect">
-            <a:avLst/>
-          </a:prstGeom>
-          <a:solidFill>
-            <a:srgbClr val="0070C0"/>
-          </a:solidFill>
-          <a:ln w="19050">
+              </a:endParaRPr>
+            </a:p>
+          </p:txBody>
+        </p:sp>
+        <p:sp>
+          <p:nvSpPr>
+            <p:cNvPr id="3" name="Rectangle 45"/>
+            <p:cNvSpPr/>
+            <p:nvPr/>
+          </p:nvSpPr>
+          <p:spPr>
+            <a:xfrm>
+              <a:off x="3412069" y="2191178"/>
+              <a:ext cx="1295400" cy="552022"/>
+            </a:xfrm>
+            <a:prstGeom prst="roundRect">
+              <a:avLst/>
+            </a:prstGeom>
             <a:solidFill>
               <a:srgbClr val="0070C0"/>
             </a:solidFill>
-          </a:ln>
-          <a:effectLst/>
-        </p:spPr>
-        <p:style>
-          <a:lnRef idx="1">
-            <a:schemeClr val="accent5"/>
-          </a:lnRef>
-          <a:fillRef idx="2">
-            <a:schemeClr val="accent5"/>
-          </a:fillRef>
-          <a:effectRef idx="1">
-            <a:schemeClr val="accent5"/>
-          </a:effectRef>
-          <a:fontRef idx="minor">
-            <a:schemeClr val="dk1"/>
-          </a:fontRef>
-        </p:style>
-        <p:txBody>
-          <a:bodyPr rtlCol="0" anchor="ctr"/>
-          <a:lstStyle/>
-          <a:p>
-            <a:pPr algn="ctr"/>
-            <a:r>
-              <a:rPr lang="en-US" sz="1600" dirty="0">
+            <a:ln w="19050">
+              <a:solidFill>
+                <a:srgbClr val="0070C0"/>
+              </a:solidFill>
+            </a:ln>
+            <a:effectLst/>
+          </p:spPr>
+          <p:style>
+            <a:lnRef idx="1">
+              <a:schemeClr val="accent5"/>
+            </a:lnRef>
+            <a:fillRef idx="2">
+              <a:schemeClr val="accent5"/>
+            </a:fillRef>
+            <a:effectRef idx="1">
+              <a:schemeClr val="accent5"/>
+            </a:effectRef>
+            <a:fontRef idx="minor">
+              <a:schemeClr val="dk1"/>
+            </a:fontRef>
+          </p:style>
+          <p:txBody>
+            <a:bodyPr rtlCol="0" anchor="ctr"/>
+            <a:lstStyle/>
+            <a:p>
+              <a:pPr algn="ctr"/>
+              <a:r>
+                <a:rPr lang="en-US" sz="1600" dirty="0">
+                  <a:solidFill>
+                    <a:schemeClr val="bg1"/>
+                  </a:solidFill>
+                </a:rPr>
+                <a:t>Logic</a:t>
+              </a:r>
+              <a:endParaRPr lang="en-SG" sz="1600" dirty="0">
                 <a:solidFill>
                   <a:schemeClr val="bg1"/>
                 </a:solidFill>
-              </a:rPr>
-              <a:t>Logic</a:t>
-            </a:r>
-            <a:endParaRPr lang="en-SG" sz="1600" dirty="0">
-              <a:solidFill>
-                <a:schemeClr val="bg1"/>
-              </a:solidFill>
-            </a:endParaRPr>
-          </a:p>
-        </p:txBody>
-      </p:sp>
-      <p:sp>
-        <p:nvSpPr>
-          <p:cNvPr id="4" name="Rectangle 45"/>
-          <p:cNvSpPr/>
-          <p:nvPr/>
-        </p:nvSpPr>
-        <p:spPr>
-          <a:xfrm>
-            <a:off x="5164669" y="2191179"/>
-            <a:ext cx="1447800" cy="552022"/>
-          </a:xfrm>
-          <a:prstGeom prst="roundRect">
-            <a:avLst/>
-          </a:prstGeom>
-          <a:solidFill>
-            <a:schemeClr val="accent6">
-              <a:lumMod val="75000"/>
-            </a:schemeClr>
-          </a:solidFill>
-          <a:ln w="19050">
+              </a:endParaRPr>
+            </a:p>
+          </p:txBody>
+        </p:sp>
+        <p:sp>
+          <p:nvSpPr>
+            <p:cNvPr id="4" name="Rectangle 45"/>
+            <p:cNvSpPr/>
+            <p:nvPr/>
+          </p:nvSpPr>
+          <p:spPr>
+            <a:xfrm>
+              <a:off x="5164669" y="2191179"/>
+              <a:ext cx="1447800" cy="552022"/>
+            </a:xfrm>
+            <a:prstGeom prst="roundRect">
+              <a:avLst/>
+            </a:prstGeom>
             <a:solidFill>
               <a:schemeClr val="accent6">
                 <a:lumMod val="75000"/>
               </a:schemeClr>
             </a:solidFill>
-          </a:ln>
-          <a:effectLst/>
-        </p:spPr>
-        <p:style>
-          <a:lnRef idx="1">
-            <a:schemeClr val="accent5"/>
-          </a:lnRef>
-          <a:fillRef idx="2">
-            <a:schemeClr val="accent5"/>
-          </a:fillRef>
-          <a:effectRef idx="1">
-            <a:schemeClr val="accent5"/>
-          </a:effectRef>
-          <a:fontRef idx="minor">
-            <a:schemeClr val="dk1"/>
-          </a:fontRef>
-        </p:style>
-        <p:txBody>
-          <a:bodyPr rtlCol="0" anchor="ctr"/>
-          <a:lstStyle/>
-          <a:p>
-            <a:pPr algn="ctr"/>
-            <a:r>
-              <a:rPr lang="en-US" sz="1600" dirty="0">
+            <a:ln w="19050">
+              <a:solidFill>
+                <a:schemeClr val="accent6">
+                  <a:lumMod val="75000"/>
+                </a:schemeClr>
+              </a:solidFill>
+            </a:ln>
+            <a:effectLst/>
+          </p:spPr>
+          <p:style>
+            <a:lnRef idx="1">
+              <a:schemeClr val="accent5"/>
+            </a:lnRef>
+            <a:fillRef idx="2">
+              <a:schemeClr val="accent5"/>
+            </a:fillRef>
+            <a:effectRef idx="1">
+              <a:schemeClr val="accent5"/>
+            </a:effectRef>
+            <a:fontRef idx="minor">
+              <a:schemeClr val="dk1"/>
+            </a:fontRef>
+          </p:style>
+          <p:txBody>
+            <a:bodyPr rtlCol="0" anchor="ctr"/>
+            <a:lstStyle/>
+            <a:p>
+              <a:pPr algn="ctr"/>
+              <a:r>
+                <a:rPr lang="en-US" sz="1600" dirty="0">
+                  <a:solidFill>
+                    <a:schemeClr val="bg1"/>
+                  </a:solidFill>
+                </a:rPr>
+                <a:t>Storage</a:t>
+              </a:r>
+              <a:endParaRPr lang="en-SG" sz="1600" dirty="0">
                 <a:solidFill>
                   <a:schemeClr val="bg1"/>
                 </a:solidFill>
-              </a:rPr>
-              <a:t>Storage</a:t>
-            </a:r>
-            <a:endParaRPr lang="en-SG" sz="1600" dirty="0">
-              <a:solidFill>
-                <a:schemeClr val="bg1"/>
-              </a:solidFill>
-            </a:endParaRPr>
-          </a:p>
-        </p:txBody>
-      </p:sp>
-      <p:sp>
-        <p:nvSpPr>
-          <p:cNvPr id="5" name="Rectangle 45"/>
-          <p:cNvSpPr/>
-          <p:nvPr/>
-        </p:nvSpPr>
-        <p:spPr>
-          <a:xfrm>
-            <a:off x="3412069" y="3124200"/>
-            <a:ext cx="1295400" cy="723791"/>
-          </a:xfrm>
-          <a:prstGeom prst="roundRect">
-            <a:avLst/>
-          </a:prstGeom>
-          <a:solidFill>
-            <a:srgbClr val="7030A0"/>
-          </a:solidFill>
-          <a:ln w="19050">
+              </a:endParaRPr>
+            </a:p>
+          </p:txBody>
+        </p:sp>
+        <p:sp>
+          <p:nvSpPr>
+            <p:cNvPr id="5" name="Rectangle 45"/>
+            <p:cNvSpPr/>
+            <p:nvPr/>
+          </p:nvSpPr>
+          <p:spPr>
+            <a:xfrm>
+              <a:off x="3412069" y="3124200"/>
+              <a:ext cx="1295400" cy="723791"/>
+            </a:xfrm>
+            <a:prstGeom prst="roundRect">
+              <a:avLst/>
+            </a:prstGeom>
             <a:solidFill>
               <a:srgbClr val="7030A0"/>
             </a:solidFill>
-          </a:ln>
-          <a:effectLst/>
-        </p:spPr>
-        <p:style>
-          <a:lnRef idx="1">
-            <a:schemeClr val="accent5"/>
-          </a:lnRef>
-          <a:fillRef idx="2">
-            <a:schemeClr val="accent5"/>
-          </a:fillRef>
-          <a:effectRef idx="1">
-            <a:schemeClr val="accent5"/>
-          </a:effectRef>
-          <a:fontRef idx="minor">
-            <a:schemeClr val="dk1"/>
-          </a:fontRef>
-        </p:style>
-        <p:txBody>
-          <a:bodyPr rtlCol="0" anchor="ctr"/>
-          <a:lstStyle/>
-          <a:p>
-            <a:pPr algn="ctr"/>
-            <a:r>
-              <a:rPr lang="en-US" sz="1600" dirty="0">
+            <a:ln w="19050">
+              <a:solidFill>
+                <a:srgbClr val="7030A0"/>
+              </a:solidFill>
+            </a:ln>
+            <a:effectLst/>
+          </p:spPr>
+          <p:style>
+            <a:lnRef idx="1">
+              <a:schemeClr val="accent5"/>
+            </a:lnRef>
+            <a:fillRef idx="2">
+              <a:schemeClr val="accent5"/>
+            </a:fillRef>
+            <a:effectRef idx="1">
+              <a:schemeClr val="accent5"/>
+            </a:effectRef>
+            <a:fontRef idx="minor">
+              <a:schemeClr val="dk1"/>
+            </a:fontRef>
+          </p:style>
+          <p:txBody>
+            <a:bodyPr rtlCol="0" anchor="ctr"/>
+            <a:lstStyle/>
+            <a:p>
+              <a:pPr algn="ctr"/>
+              <a:r>
+                <a:rPr lang="en-US" sz="1600" dirty="0">
+                  <a:solidFill>
+                    <a:schemeClr val="bg1"/>
+                  </a:solidFill>
+                </a:rPr>
+                <a:t>Model</a:t>
+              </a:r>
+              <a:endParaRPr lang="en-SG" sz="1600" dirty="0">
                 <a:solidFill>
                   <a:schemeClr val="bg1"/>
                 </a:solidFill>
-              </a:rPr>
-              <a:t>Model</a:t>
-            </a:r>
-            <a:endParaRPr lang="en-SG" sz="1600" dirty="0">
-              <a:solidFill>
-                <a:schemeClr val="bg1"/>
-              </a:solidFill>
-            </a:endParaRPr>
-          </a:p>
-        </p:txBody>
-      </p:sp>
-      <p:sp>
-        <p:nvSpPr>
-          <p:cNvPr id="8" name="Rectangle 45"/>
-          <p:cNvSpPr/>
-          <p:nvPr/>
-        </p:nvSpPr>
-        <p:spPr>
-          <a:xfrm>
-            <a:off x="3217846" y="4131994"/>
-            <a:ext cx="2658531" cy="444640"/>
-          </a:xfrm>
-          <a:prstGeom prst="roundRect">
-            <a:avLst/>
-          </a:prstGeom>
-          <a:solidFill>
-            <a:schemeClr val="accent5">
-              <a:lumMod val="75000"/>
-            </a:schemeClr>
-          </a:solidFill>
-          <a:ln w="19050">
+              </a:endParaRPr>
+            </a:p>
+          </p:txBody>
+        </p:sp>
+        <p:sp>
+          <p:nvSpPr>
+            <p:cNvPr id="8" name="Rectangle 45"/>
+            <p:cNvSpPr/>
+            <p:nvPr/>
+          </p:nvSpPr>
+          <p:spPr>
+            <a:xfrm>
+              <a:off x="3217846" y="4131994"/>
+              <a:ext cx="2658531" cy="444640"/>
+            </a:xfrm>
+            <a:prstGeom prst="roundRect">
+              <a:avLst/>
+            </a:prstGeom>
             <a:solidFill>
               <a:schemeClr val="accent5">
                 <a:lumMod val="75000"/>
               </a:schemeClr>
             </a:solidFill>
-          </a:ln>
-          <a:effectLst/>
-        </p:spPr>
-        <p:style>
-          <a:lnRef idx="1">
-            <a:schemeClr val="accent5"/>
-          </a:lnRef>
-          <a:fillRef idx="2">
-            <a:schemeClr val="accent5"/>
-          </a:fillRef>
-          <a:effectRef idx="1">
-            <a:schemeClr val="accent5"/>
-          </a:effectRef>
-          <a:fontRef idx="minor">
-            <a:schemeClr val="dk1"/>
-          </a:fontRef>
-        </p:style>
-        <p:txBody>
-          <a:bodyPr rtlCol="0" anchor="ctr"/>
-          <a:lstStyle/>
-          <a:p>
-            <a:pPr algn="ctr"/>
-            <a:r>
-              <a:rPr lang="en-US" sz="1400" dirty="0">
+            <a:ln w="19050">
+              <a:solidFill>
+                <a:schemeClr val="accent5">
+                  <a:lumMod val="75000"/>
+                </a:schemeClr>
+              </a:solidFill>
+            </a:ln>
+            <a:effectLst/>
+          </p:spPr>
+          <p:style>
+            <a:lnRef idx="1">
+              <a:schemeClr val="accent5"/>
+            </a:lnRef>
+            <a:fillRef idx="2">
+              <a:schemeClr val="accent5"/>
+            </a:fillRef>
+            <a:effectRef idx="1">
+              <a:schemeClr val="accent5"/>
+            </a:effectRef>
+            <a:fontRef idx="minor">
+              <a:schemeClr val="dk1"/>
+            </a:fontRef>
+          </p:style>
+          <p:txBody>
+            <a:bodyPr rtlCol="0" anchor="ctr"/>
+            <a:lstStyle/>
+            <a:p>
+              <a:pPr algn="ctr"/>
+              <a:r>
+                <a:rPr lang="en-US" sz="1400" dirty="0">
+                  <a:solidFill>
+                    <a:schemeClr val="bg1"/>
+                  </a:solidFill>
+                </a:rPr>
+                <a:t>Commons</a:t>
+              </a:r>
+              <a:endParaRPr lang="en-SG" sz="1400" dirty="0">
                 <a:solidFill>
                   <a:schemeClr val="bg1"/>
                 </a:solidFill>
-              </a:rPr>
-              <a:t>Commons</a:t>
-            </a:r>
-            <a:endParaRPr lang="en-SG" sz="1400" dirty="0">
+              </a:endParaRPr>
+            </a:p>
+          </p:txBody>
+        </p:sp>
+        <p:cxnSp>
+          <p:nvCxnSpPr>
+            <p:cNvPr id="10" name="Straight Arrow Connector 9"/>
+            <p:cNvCxnSpPr>
+              <a:endCxn id="3" idx="1"/>
+            </p:cNvCxnSpPr>
+            <p:nvPr/>
+          </p:nvCxnSpPr>
+          <p:spPr>
+            <a:xfrm>
+              <a:off x="2573871" y="2467189"/>
+              <a:ext cx="838198" cy="0"/>
+            </a:xfrm>
+            <a:prstGeom prst="straightConnector1">
+              <a:avLst/>
+            </a:prstGeom>
+            <a:ln w="28575">
               <a:solidFill>
-                <a:schemeClr val="bg1"/>
+                <a:srgbClr val="00B050"/>
               </a:solidFill>
-            </a:endParaRPr>
-          </a:p>
-        </p:txBody>
-      </p:sp>
-      <p:cxnSp>
-        <p:nvCxnSpPr>
-          <p:cNvPr id="10" name="Straight Arrow Connector 9"/>
-          <p:cNvCxnSpPr>
-            <a:endCxn id="3" idx="1"/>
-          </p:cNvCxnSpPr>
-          <p:nvPr/>
-        </p:nvCxnSpPr>
-        <p:spPr>
-          <a:xfrm>
-            <a:off x="2573871" y="2467189"/>
-            <a:ext cx="838198" cy="0"/>
-          </a:xfrm>
-          <a:prstGeom prst="straightConnector1">
-            <a:avLst/>
-          </a:prstGeom>
-          <a:ln w="28575">
+              <a:tailEnd type="arrow"/>
+            </a:ln>
+          </p:spPr>
+          <p:style>
+            <a:lnRef idx="1">
+              <a:schemeClr val="accent1"/>
+            </a:lnRef>
+            <a:fillRef idx="0">
+              <a:schemeClr val="accent1"/>
+            </a:fillRef>
+            <a:effectRef idx="0">
+              <a:schemeClr val="accent1"/>
+            </a:effectRef>
+            <a:fontRef idx="minor">
+              <a:schemeClr val="tx1"/>
+            </a:fontRef>
+          </p:style>
+        </p:cxnSp>
+        <p:cxnSp>
+          <p:nvCxnSpPr>
+            <p:cNvPr id="12" name="Straight Arrow Connector 11"/>
+            <p:cNvCxnSpPr/>
+            <p:nvPr/>
+          </p:nvCxnSpPr>
+          <p:spPr>
+            <a:xfrm>
+              <a:off x="2569639" y="3276600"/>
+              <a:ext cx="838198" cy="0"/>
+            </a:xfrm>
+            <a:prstGeom prst="straightConnector1">
+              <a:avLst/>
+            </a:prstGeom>
+            <a:ln w="28575">
+              <a:solidFill>
+                <a:srgbClr val="00B050"/>
+              </a:solidFill>
+              <a:tailEnd type="arrow"/>
+            </a:ln>
+          </p:spPr>
+          <p:style>
+            <a:lnRef idx="1">
+              <a:schemeClr val="accent1"/>
+            </a:lnRef>
+            <a:fillRef idx="0">
+              <a:schemeClr val="accent1"/>
+            </a:fillRef>
+            <a:effectRef idx="0">
+              <a:schemeClr val="accent1"/>
+            </a:effectRef>
+            <a:fontRef idx="minor">
+              <a:schemeClr val="tx1"/>
+            </a:fontRef>
+          </p:style>
+        </p:cxnSp>
+        <p:cxnSp>
+          <p:nvCxnSpPr>
+            <p:cNvPr id="13" name="Straight Arrow Connector 12"/>
+            <p:cNvCxnSpPr>
+              <a:stCxn id="3" idx="2"/>
+              <a:endCxn id="5" idx="0"/>
+            </p:cNvCxnSpPr>
+            <p:nvPr/>
+          </p:nvCxnSpPr>
+          <p:spPr>
+            <a:xfrm>
+              <a:off x="4059769" y="2743200"/>
+              <a:ext cx="0" cy="381000"/>
+            </a:xfrm>
+            <a:prstGeom prst="straightConnector1">
+              <a:avLst/>
+            </a:prstGeom>
+            <a:ln w="28575">
+              <a:solidFill>
+                <a:srgbClr val="0070C0"/>
+              </a:solidFill>
+              <a:tailEnd type="arrow"/>
+            </a:ln>
+          </p:spPr>
+          <p:style>
+            <a:lnRef idx="1">
+              <a:schemeClr val="accent1"/>
+            </a:lnRef>
+            <a:fillRef idx="0">
+              <a:schemeClr val="accent1"/>
+            </a:fillRef>
+            <a:effectRef idx="0">
+              <a:schemeClr val="accent1"/>
+            </a:effectRef>
+            <a:fontRef idx="minor">
+              <a:schemeClr val="tx1"/>
+            </a:fontRef>
+          </p:style>
+        </p:cxnSp>
+        <p:cxnSp>
+          <p:nvCxnSpPr>
+            <p:cNvPr id="16" name="Straight Arrow Connector 15"/>
+            <p:cNvCxnSpPr/>
+            <p:nvPr/>
+          </p:nvCxnSpPr>
+          <p:spPr>
+            <a:xfrm>
+              <a:off x="4707469" y="2467189"/>
+              <a:ext cx="457200" cy="0"/>
+            </a:xfrm>
+            <a:prstGeom prst="straightConnector1">
+              <a:avLst/>
+            </a:prstGeom>
+            <a:ln w="28575">
+              <a:solidFill>
+                <a:srgbClr val="0070C0"/>
+              </a:solidFill>
+              <a:tailEnd type="arrow"/>
+            </a:ln>
+          </p:spPr>
+          <p:style>
+            <a:lnRef idx="1">
+              <a:schemeClr val="accent1"/>
+            </a:lnRef>
+            <a:fillRef idx="0">
+              <a:schemeClr val="accent1"/>
+            </a:fillRef>
+            <a:effectRef idx="0">
+              <a:schemeClr val="accent1"/>
+            </a:effectRef>
+            <a:fontRef idx="minor">
+              <a:schemeClr val="tx1"/>
+            </a:fontRef>
+          </p:style>
+        </p:cxnSp>
+        <p:sp>
+          <p:nvSpPr>
+            <p:cNvPr id="29" name="Smiley Face 28"/>
+            <p:cNvSpPr/>
+            <p:nvPr/>
+          </p:nvSpPr>
+          <p:spPr>
+            <a:xfrm>
+              <a:off x="1202269" y="2743200"/>
+              <a:ext cx="381000" cy="381000"/>
+            </a:xfrm>
+            <a:prstGeom prst="smileyFace">
+              <a:avLst/>
+            </a:prstGeom>
             <a:solidFill>
-              <a:srgbClr val="00B050"/>
+              <a:schemeClr val="bg1"/>
             </a:solidFill>
-            <a:tailEnd type="arrow"/>
-          </a:ln>
-        </p:spPr>
-        <p:style>
-          <a:lnRef idx="1">
-            <a:schemeClr val="accent1"/>
-          </a:lnRef>
-          <a:fillRef idx="0">
-            <a:schemeClr val="accent1"/>
-          </a:fillRef>
-          <a:effectRef idx="0">
-            <a:schemeClr val="accent1"/>
-          </a:effectRef>
-          <a:fontRef idx="minor">
-            <a:schemeClr val="tx1"/>
-          </a:fontRef>
-        </p:style>
-      </p:cxnSp>
-      <p:cxnSp>
-        <p:nvCxnSpPr>
-          <p:cNvPr id="12" name="Straight Arrow Connector 11"/>
-          <p:cNvCxnSpPr/>
-          <p:nvPr/>
-        </p:nvCxnSpPr>
-        <p:spPr>
-          <a:xfrm>
-            <a:off x="2569639" y="3276600"/>
-            <a:ext cx="838198" cy="0"/>
-          </a:xfrm>
-          <a:prstGeom prst="straightConnector1">
-            <a:avLst/>
-          </a:prstGeom>
-          <a:ln w="28575">
+            <a:ln>
+              <a:solidFill>
+                <a:schemeClr val="tx1"/>
+              </a:solidFill>
+            </a:ln>
+          </p:spPr>
+          <p:style>
+            <a:lnRef idx="2">
+              <a:schemeClr val="accent1">
+                <a:shade val="50000"/>
+              </a:schemeClr>
+            </a:lnRef>
+            <a:fillRef idx="1">
+              <a:schemeClr val="accent1"/>
+            </a:fillRef>
+            <a:effectRef idx="0">
+              <a:schemeClr val="accent1"/>
+            </a:effectRef>
+            <a:fontRef idx="minor">
+              <a:schemeClr val="lt1"/>
+            </a:fontRef>
+          </p:style>
+          <p:txBody>
+            <a:bodyPr rtlCol="0" anchor="ctr"/>
+            <a:lstStyle/>
+            <a:p>
+              <a:pPr algn="ctr"/>
+              <a:endParaRPr lang="en-US"/>
+            </a:p>
+          </p:txBody>
+        </p:sp>
+        <p:cxnSp>
+          <p:nvCxnSpPr>
+            <p:cNvPr id="32" name="Straight Arrow Connector 31"/>
+            <p:cNvCxnSpPr/>
+            <p:nvPr/>
+          </p:nvCxnSpPr>
+          <p:spPr>
+            <a:xfrm flipV="1">
+              <a:off x="1636188" y="2939996"/>
+              <a:ext cx="273050" cy="1"/>
+            </a:xfrm>
+            <a:prstGeom prst="straightConnector1">
+              <a:avLst/>
+            </a:prstGeom>
+            <a:ln w="28575">
+              <a:solidFill>
+                <a:schemeClr val="tx1"/>
+              </a:solidFill>
+              <a:prstDash val="sysDot"/>
+              <a:tailEnd type="arrow"/>
+            </a:ln>
+          </p:spPr>
+          <p:style>
+            <a:lnRef idx="1">
+              <a:schemeClr val="accent1"/>
+            </a:lnRef>
+            <a:fillRef idx="0">
+              <a:schemeClr val="accent1"/>
+            </a:fillRef>
+            <a:effectRef idx="0">
+              <a:schemeClr val="accent1"/>
+            </a:effectRef>
+            <a:fontRef idx="minor">
+              <a:schemeClr val="tx1"/>
+            </a:fontRef>
+          </p:style>
+        </p:cxnSp>
+        <p:cxnSp>
+          <p:nvCxnSpPr>
+            <p:cNvPr id="34" name="Straight Arrow Connector 33"/>
+            <p:cNvCxnSpPr/>
+            <p:nvPr/>
+          </p:nvCxnSpPr>
+          <p:spPr>
+            <a:xfrm flipV="1">
+              <a:off x="6680199" y="2467190"/>
+              <a:ext cx="939801" cy="1"/>
+            </a:xfrm>
+            <a:prstGeom prst="straightConnector1">
+              <a:avLst/>
+            </a:prstGeom>
+            <a:ln w="28575">
+              <a:solidFill>
+                <a:schemeClr val="accent6">
+                  <a:lumMod val="75000"/>
+                </a:schemeClr>
+              </a:solidFill>
+              <a:prstDash val="sysDot"/>
+              <a:tailEnd type="arrow"/>
+            </a:ln>
+          </p:spPr>
+          <p:style>
+            <a:lnRef idx="1">
+              <a:schemeClr val="accent1"/>
+            </a:lnRef>
+            <a:fillRef idx="0">
+              <a:schemeClr val="accent1"/>
+            </a:fillRef>
+            <a:effectRef idx="0">
+              <a:schemeClr val="accent1"/>
+            </a:effectRef>
+            <a:fontRef idx="minor">
+              <a:schemeClr val="tx1"/>
+            </a:fontRef>
+          </p:style>
+        </p:cxnSp>
+        <p:sp>
+          <p:nvSpPr>
+            <p:cNvPr id="35" name="Folded Corner 34"/>
+            <p:cNvSpPr/>
+            <p:nvPr/>
+          </p:nvSpPr>
+          <p:spPr>
+            <a:xfrm>
+              <a:off x="7679269" y="2286000"/>
+              <a:ext cx="381000" cy="381000"/>
+            </a:xfrm>
+            <a:prstGeom prst="foldedCorner">
+              <a:avLst/>
+            </a:prstGeom>
             <a:solidFill>
-              <a:srgbClr val="00B050"/>
+              <a:schemeClr val="bg1"/>
             </a:solidFill>
-            <a:tailEnd type="arrow"/>
-          </a:ln>
-        </p:spPr>
-        <p:style>
-          <a:lnRef idx="1">
-            <a:schemeClr val="accent1"/>
-          </a:lnRef>
-          <a:fillRef idx="0">
-            <a:schemeClr val="accent1"/>
-          </a:fillRef>
-          <a:effectRef idx="0">
-            <a:schemeClr val="accent1"/>
-          </a:effectRef>
-          <a:fontRef idx="minor">
-            <a:schemeClr val="tx1"/>
-          </a:fontRef>
-        </p:style>
-      </p:cxnSp>
-      <p:cxnSp>
-        <p:nvCxnSpPr>
-          <p:cNvPr id="13" name="Straight Arrow Connector 12"/>
-          <p:cNvCxnSpPr>
-            <a:stCxn id="3" idx="2"/>
-            <a:endCxn id="5" idx="0"/>
-          </p:cNvCxnSpPr>
-          <p:nvPr/>
-        </p:nvCxnSpPr>
-        <p:spPr>
-          <a:xfrm>
-            <a:off x="4059769" y="2743200"/>
-            <a:ext cx="0" cy="381000"/>
-          </a:xfrm>
-          <a:prstGeom prst="straightConnector1">
-            <a:avLst/>
-          </a:prstGeom>
-          <a:ln w="28575">
+            <a:ln>
+              <a:solidFill>
+                <a:schemeClr val="tx1"/>
+              </a:solidFill>
+            </a:ln>
+          </p:spPr>
+          <p:style>
+            <a:lnRef idx="2">
+              <a:schemeClr val="accent1">
+                <a:shade val="50000"/>
+              </a:schemeClr>
+            </a:lnRef>
+            <a:fillRef idx="1">
+              <a:schemeClr val="accent1"/>
+            </a:fillRef>
+            <a:effectRef idx="0">
+              <a:schemeClr val="accent1"/>
+            </a:effectRef>
+            <a:fontRef idx="minor">
+              <a:schemeClr val="lt1"/>
+            </a:fontRef>
+          </p:style>
+          <p:txBody>
+            <a:bodyPr rtlCol="0" anchor="ctr"/>
+            <a:lstStyle/>
+            <a:p>
+              <a:pPr algn="ctr"/>
+              <a:endParaRPr lang="en-US"/>
+            </a:p>
+          </p:txBody>
+        </p:sp>
+        <p:sp>
+          <p:nvSpPr>
+            <p:cNvPr id="36" name="Folded Corner 35"/>
+            <p:cNvSpPr/>
+            <p:nvPr/>
+          </p:nvSpPr>
+          <p:spPr>
+            <a:xfrm>
+              <a:off x="7772400" y="2362200"/>
+              <a:ext cx="381000" cy="381000"/>
+            </a:xfrm>
+            <a:prstGeom prst="foldedCorner">
+              <a:avLst/>
+            </a:prstGeom>
             <a:solidFill>
-              <a:srgbClr val="0070C0"/>
+              <a:schemeClr val="bg1"/>
             </a:solidFill>
-            <a:tailEnd type="arrow"/>
-          </a:ln>
-        </p:spPr>
-        <p:style>
-          <a:lnRef idx="1">
-            <a:schemeClr val="accent1"/>
-          </a:lnRef>
-          <a:fillRef idx="0">
-            <a:schemeClr val="accent1"/>
-          </a:fillRef>
-          <a:effectRef idx="0">
-            <a:schemeClr val="accent1"/>
-          </a:effectRef>
-          <a:fontRef idx="minor">
-            <a:schemeClr val="tx1"/>
-          </a:fontRef>
-        </p:style>
-      </p:cxnSp>
-      <p:cxnSp>
-        <p:nvCxnSpPr>
-          <p:cNvPr id="16" name="Straight Arrow Connector 15"/>
-          <p:cNvCxnSpPr/>
-          <p:nvPr/>
-        </p:nvCxnSpPr>
-        <p:spPr>
-          <a:xfrm>
-            <a:off x="4707469" y="2467189"/>
-            <a:ext cx="457200" cy="0"/>
-          </a:xfrm>
-          <a:prstGeom prst="straightConnector1">
-            <a:avLst/>
-          </a:prstGeom>
-          <a:ln w="28575">
+            <a:ln>
+              <a:solidFill>
+                <a:schemeClr val="tx1"/>
+              </a:solidFill>
+            </a:ln>
+          </p:spPr>
+          <p:style>
+            <a:lnRef idx="2">
+              <a:schemeClr val="accent1">
+                <a:shade val="50000"/>
+              </a:schemeClr>
+            </a:lnRef>
+            <a:fillRef idx="1">
+              <a:schemeClr val="accent1"/>
+            </a:fillRef>
+            <a:effectRef idx="0">
+              <a:schemeClr val="accent1"/>
+            </a:effectRef>
+            <a:fontRef idx="minor">
+              <a:schemeClr val="lt1"/>
+            </a:fontRef>
+          </p:style>
+          <p:txBody>
+            <a:bodyPr rtlCol="0" anchor="ctr"/>
+            <a:lstStyle/>
+            <a:p>
+              <a:pPr algn="ctr"/>
+              <a:endParaRPr lang="en-US"/>
+            </a:p>
+          </p:txBody>
+        </p:sp>
+        <p:sp>
+          <p:nvSpPr>
+            <p:cNvPr id="51" name="Cloud 50"/>
+            <p:cNvSpPr/>
+            <p:nvPr/>
+          </p:nvSpPr>
+          <p:spPr>
+            <a:xfrm>
+              <a:off x="2650069" y="1447800"/>
+              <a:ext cx="914400" cy="533400"/>
+            </a:xfrm>
+            <a:prstGeom prst="cloud">
+              <a:avLst/>
+            </a:prstGeom>
             <a:solidFill>
-              <a:srgbClr val="0070C0"/>
+              <a:schemeClr val="bg1"/>
             </a:solidFill>
-            <a:tailEnd type="arrow"/>
-          </a:ln>
-        </p:spPr>
-        <p:style>
-          <a:lnRef idx="1">
-            <a:schemeClr val="accent1"/>
-          </a:lnRef>
-          <a:fillRef idx="0">
-            <a:schemeClr val="accent1"/>
-          </a:fillRef>
-          <a:effectRef idx="0">
-            <a:schemeClr val="accent1"/>
-          </a:effectRef>
-          <a:fontRef idx="minor">
-            <a:schemeClr val="tx1"/>
-          </a:fontRef>
-        </p:style>
-      </p:cxnSp>
-      <p:sp>
-        <p:nvSpPr>
-          <p:cNvPr id="29" name="Smiley Face 28"/>
-          <p:cNvSpPr/>
-          <p:nvPr/>
-        </p:nvSpPr>
-        <p:spPr>
-          <a:xfrm>
-            <a:off x="1202269" y="2743200"/>
-            <a:ext cx="381000" cy="381000"/>
-          </a:xfrm>
-          <a:prstGeom prst="smileyFace">
-            <a:avLst/>
-          </a:prstGeom>
-          <a:solidFill>
-            <a:schemeClr val="bg1"/>
-          </a:solidFill>
-          <a:ln>
-            <a:solidFill>
+            <a:ln>
+              <a:solidFill>
+                <a:schemeClr val="tx1"/>
+              </a:solidFill>
+            </a:ln>
+          </p:spPr>
+          <p:style>
+            <a:lnRef idx="2">
+              <a:schemeClr val="accent1">
+                <a:shade val="50000"/>
+              </a:schemeClr>
+            </a:lnRef>
+            <a:fillRef idx="1">
+              <a:schemeClr val="accent1"/>
+            </a:fillRef>
+            <a:effectRef idx="0">
+              <a:schemeClr val="accent1"/>
+            </a:effectRef>
+            <a:fontRef idx="minor">
+              <a:schemeClr val="lt1"/>
+            </a:fontRef>
+          </p:style>
+          <p:txBody>
+            <a:bodyPr rtlCol="0" anchor="ctr"/>
+            <a:lstStyle/>
+            <a:p>
+              <a:pPr algn="ctr"/>
+              <a:r>
+                <a:rPr lang="en-US" sz="1400" dirty="0">
+                  <a:solidFill>
+                    <a:schemeClr val="tx1"/>
+                  </a:solidFill>
+                </a:rPr>
+                <a:t>Web</a:t>
+              </a:r>
+            </a:p>
+          </p:txBody>
+        </p:sp>
+        <p:cxnSp>
+          <p:nvCxnSpPr>
+            <p:cNvPr id="52" name="Elbow Connector 51"/>
+            <p:cNvCxnSpPr>
+              <a:stCxn id="2" idx="0"/>
+              <a:endCxn id="51" idx="2"/>
+            </p:cNvCxnSpPr>
+            <p:nvPr/>
+          </p:nvCxnSpPr>
+          <p:spPr>
+            <a:xfrm rot="5400000" flipH="1" flipV="1">
+              <a:off x="2222648" y="1760922"/>
+              <a:ext cx="476678" cy="383835"/>
+            </a:xfrm>
+            <a:prstGeom prst="bentConnector2">
+              <a:avLst/>
+            </a:prstGeom>
+            <a:ln w="28575">
+              <a:solidFill>
+                <a:srgbClr val="00B050"/>
+              </a:solidFill>
+              <a:prstDash val="sysDot"/>
+              <a:tailEnd type="arrow"/>
+            </a:ln>
+          </p:spPr>
+          <p:style>
+            <a:lnRef idx="1">
+              <a:schemeClr val="accent1"/>
+            </a:lnRef>
+            <a:fillRef idx="0">
+              <a:schemeClr val="accent1"/>
+            </a:fillRef>
+            <a:effectRef idx="0">
+              <a:schemeClr val="accent1"/>
+            </a:effectRef>
+            <a:fontRef idx="minor">
               <a:schemeClr val="tx1"/>
-            </a:solidFill>
-          </a:ln>
-        </p:spPr>
-        <p:style>
-          <a:lnRef idx="2">
-            <a:schemeClr val="accent1">
-              <a:shade val="50000"/>
-            </a:schemeClr>
-          </a:lnRef>
-          <a:fillRef idx="1">
-            <a:schemeClr val="accent1"/>
-          </a:fillRef>
-          <a:effectRef idx="0">
-            <a:schemeClr val="accent1"/>
-          </a:effectRef>
-          <a:fontRef idx="minor">
-            <a:schemeClr val="lt1"/>
-          </a:fontRef>
-        </p:style>
-        <p:txBody>
-          <a:bodyPr rtlCol="0" anchor="ctr"/>
-          <a:lstStyle/>
-          <a:p>
-            <a:pPr algn="ctr"/>
-            <a:endParaRPr lang="en-US"/>
-          </a:p>
-        </p:txBody>
-      </p:sp>
-      <p:cxnSp>
-        <p:nvCxnSpPr>
-          <p:cNvPr id="32" name="Straight Arrow Connector 31"/>
-          <p:cNvCxnSpPr/>
-          <p:nvPr/>
-        </p:nvCxnSpPr>
-        <p:spPr>
-          <a:xfrm flipV="1">
-            <a:off x="1636188" y="2939996"/>
-            <a:ext cx="273050" cy="1"/>
-          </a:xfrm>
-          <a:prstGeom prst="straightConnector1">
-            <a:avLst/>
-          </a:prstGeom>
-          <a:ln w="28575">
-            <a:solidFill>
-              <a:schemeClr val="tx1"/>
-            </a:solidFill>
-            <a:prstDash val="sysDot"/>
-            <a:tailEnd type="arrow"/>
-          </a:ln>
-        </p:spPr>
-        <p:style>
-          <a:lnRef idx="1">
-            <a:schemeClr val="accent1"/>
-          </a:lnRef>
-          <a:fillRef idx="0">
-            <a:schemeClr val="accent1"/>
-          </a:fillRef>
-          <a:effectRef idx="0">
-            <a:schemeClr val="accent1"/>
-          </a:effectRef>
-          <a:fontRef idx="minor">
-            <a:schemeClr val="tx1"/>
-          </a:fontRef>
-        </p:style>
-      </p:cxnSp>
-      <p:cxnSp>
-        <p:nvCxnSpPr>
-          <p:cNvPr id="34" name="Straight Arrow Connector 33"/>
-          <p:cNvCxnSpPr/>
-          <p:nvPr/>
-        </p:nvCxnSpPr>
-        <p:spPr>
-          <a:xfrm flipV="1">
-            <a:off x="6680199" y="2467190"/>
-            <a:ext cx="939801" cy="1"/>
-          </a:xfrm>
-          <a:prstGeom prst="straightConnector1">
-            <a:avLst/>
-          </a:prstGeom>
-          <a:ln w="28575">
-            <a:solidFill>
-              <a:schemeClr val="accent6">
-                <a:lumMod val="75000"/>
-              </a:schemeClr>
-            </a:solidFill>
-            <a:prstDash val="sysDot"/>
-            <a:tailEnd type="arrow"/>
-          </a:ln>
-        </p:spPr>
-        <p:style>
-          <a:lnRef idx="1">
-            <a:schemeClr val="accent1"/>
-          </a:lnRef>
-          <a:fillRef idx="0">
-            <a:schemeClr val="accent1"/>
-          </a:fillRef>
-          <a:effectRef idx="0">
-            <a:schemeClr val="accent1"/>
-          </a:effectRef>
-          <a:fontRef idx="minor">
-            <a:schemeClr val="tx1"/>
-          </a:fontRef>
-        </p:style>
-      </p:cxnSp>
-      <p:sp>
-        <p:nvSpPr>
-          <p:cNvPr id="35" name="Folded Corner 34"/>
-          <p:cNvSpPr/>
-          <p:nvPr/>
-        </p:nvSpPr>
-        <p:spPr>
-          <a:xfrm>
-            <a:off x="7679269" y="2286000"/>
-            <a:ext cx="381000" cy="381000"/>
-          </a:xfrm>
-          <a:prstGeom prst="foldedCorner">
-            <a:avLst/>
-          </a:prstGeom>
-          <a:solidFill>
-            <a:schemeClr val="bg1"/>
-          </a:solidFill>
-          <a:ln>
-            <a:solidFill>
-              <a:schemeClr val="tx1"/>
-            </a:solidFill>
-          </a:ln>
-        </p:spPr>
-        <p:style>
-          <a:lnRef idx="2">
-            <a:schemeClr val="accent1">
-              <a:shade val="50000"/>
-            </a:schemeClr>
-          </a:lnRef>
-          <a:fillRef idx="1">
-            <a:schemeClr val="accent1"/>
-          </a:fillRef>
-          <a:effectRef idx="0">
-            <a:schemeClr val="accent1"/>
-          </a:effectRef>
-          <a:fontRef idx="minor">
-            <a:schemeClr val="lt1"/>
-          </a:fontRef>
-        </p:style>
-        <p:txBody>
-          <a:bodyPr rtlCol="0" anchor="ctr"/>
-          <a:lstStyle/>
-          <a:p>
-            <a:pPr algn="ctr"/>
-            <a:endParaRPr lang="en-US"/>
-          </a:p>
-        </p:txBody>
-      </p:sp>
-      <p:sp>
-        <p:nvSpPr>
-          <p:cNvPr id="36" name="Folded Corner 35"/>
-          <p:cNvSpPr/>
-          <p:nvPr/>
-        </p:nvSpPr>
-        <p:spPr>
-          <a:xfrm>
-            <a:off x="7772400" y="2362200"/>
-            <a:ext cx="381000" cy="381000"/>
-          </a:xfrm>
-          <a:prstGeom prst="foldedCorner">
-            <a:avLst/>
-          </a:prstGeom>
-          <a:solidFill>
-            <a:schemeClr val="bg1"/>
-          </a:solidFill>
-          <a:ln>
-            <a:solidFill>
-              <a:schemeClr val="tx1"/>
-            </a:solidFill>
-          </a:ln>
-        </p:spPr>
-        <p:style>
-          <a:lnRef idx="2">
-            <a:schemeClr val="accent1">
-              <a:shade val="50000"/>
-            </a:schemeClr>
-          </a:lnRef>
-          <a:fillRef idx="1">
-            <a:schemeClr val="accent1"/>
-          </a:fillRef>
-          <a:effectRef idx="0">
-            <a:schemeClr val="accent1"/>
-          </a:effectRef>
-          <a:fontRef idx="minor">
-            <a:schemeClr val="lt1"/>
-          </a:fontRef>
-        </p:style>
-        <p:txBody>
-          <a:bodyPr rtlCol="0" anchor="ctr"/>
-          <a:lstStyle/>
-          <a:p>
-            <a:pPr algn="ctr"/>
-            <a:endParaRPr lang="en-US"/>
-          </a:p>
-        </p:txBody>
-      </p:sp>
-      <p:sp>
-        <p:nvSpPr>
-          <p:cNvPr id="51" name="Cloud 50"/>
-          <p:cNvSpPr/>
-          <p:nvPr/>
-        </p:nvSpPr>
-        <p:spPr>
-          <a:xfrm>
-            <a:off x="2650069" y="1447800"/>
-            <a:ext cx="914400" cy="533400"/>
-          </a:xfrm>
-          <a:prstGeom prst="cloud">
-            <a:avLst/>
-          </a:prstGeom>
-          <a:solidFill>
-            <a:schemeClr val="bg1"/>
-          </a:solidFill>
-          <a:ln>
-            <a:solidFill>
-              <a:schemeClr val="tx1"/>
-            </a:solidFill>
-          </a:ln>
-        </p:spPr>
-        <p:style>
-          <a:lnRef idx="2">
-            <a:schemeClr val="accent1">
-              <a:shade val="50000"/>
-            </a:schemeClr>
-          </a:lnRef>
-          <a:fillRef idx="1">
-            <a:schemeClr val="accent1"/>
-          </a:fillRef>
-          <a:effectRef idx="0">
-            <a:schemeClr val="accent1"/>
-          </a:effectRef>
-          <a:fontRef idx="minor">
-            <a:schemeClr val="lt1"/>
-          </a:fontRef>
-        </p:style>
-        <p:txBody>
-          <a:bodyPr rtlCol="0" anchor="ctr"/>
-          <a:lstStyle/>
-          <a:p>
-            <a:pPr algn="ctr"/>
-            <a:r>
-              <a:rPr lang="en-US" sz="1400" dirty="0">
-                <a:solidFill>
-                  <a:schemeClr val="tx1"/>
-                </a:solidFill>
-              </a:rPr>
-              <a:t>Web</a:t>
-            </a:r>
-          </a:p>
-        </p:txBody>
-      </p:sp>
-      <p:cxnSp>
-        <p:nvCxnSpPr>
-          <p:cNvPr id="52" name="Elbow Connector 51"/>
-          <p:cNvCxnSpPr>
-            <a:stCxn id="2" idx="0"/>
-            <a:endCxn id="51" idx="2"/>
-          </p:cNvCxnSpPr>
-          <p:nvPr/>
-        </p:nvCxnSpPr>
-        <p:spPr>
-          <a:xfrm rot="5400000" flipH="1" flipV="1">
-            <a:off x="2222648" y="1760922"/>
-            <a:ext cx="476678" cy="383835"/>
-          </a:xfrm>
-          <a:prstGeom prst="bentConnector2">
-            <a:avLst/>
-          </a:prstGeom>
-          <a:ln w="28575">
-            <a:solidFill>
-              <a:srgbClr val="00B050"/>
-            </a:solidFill>
-            <a:prstDash val="sysDot"/>
-            <a:tailEnd type="arrow"/>
-          </a:ln>
-        </p:spPr>
-        <p:style>
-          <a:lnRef idx="1">
-            <a:schemeClr val="accent1"/>
-          </a:lnRef>
-          <a:fillRef idx="0">
-            <a:schemeClr val="accent1"/>
-          </a:fillRef>
-          <a:effectRef idx="0">
-            <a:schemeClr val="accent1"/>
-          </a:effectRef>
-          <a:fontRef idx="minor">
-            <a:schemeClr val="tx1"/>
-          </a:fontRef>
-        </p:style>
-      </p:cxnSp>
-      <p:sp>
-        <p:nvSpPr>
-          <p:cNvPr id="23" name="Rectangle 62"/>
-          <p:cNvSpPr/>
-          <p:nvPr/>
-        </p:nvSpPr>
-        <p:spPr>
-          <a:xfrm flipH="1">
-            <a:off x="1964269" y="3959459"/>
-            <a:ext cx="778931" cy="570908"/>
-          </a:xfrm>
-          <a:prstGeom prst="roundRect">
-            <a:avLst/>
-          </a:prstGeom>
-          <a:solidFill>
-            <a:srgbClr val="C00000"/>
-          </a:solidFill>
-          <a:ln w="19050">
+            </a:fontRef>
+          </p:style>
+        </p:cxnSp>
+        <p:sp>
+          <p:nvSpPr>
+            <p:cNvPr id="23" name="Rectangle 62"/>
+            <p:cNvSpPr/>
+            <p:nvPr/>
+          </p:nvSpPr>
+          <p:spPr>
+            <a:xfrm flipH="1">
+              <a:off x="1964269" y="3959459"/>
+              <a:ext cx="778931" cy="570908"/>
+            </a:xfrm>
+            <a:prstGeom prst="roundRect">
+              <a:avLst/>
+            </a:prstGeom>
             <a:solidFill>
               <a:srgbClr val="C00000"/>
             </a:solidFill>
-          </a:ln>
-          <a:effectLst/>
-        </p:spPr>
-        <p:style>
-          <a:lnRef idx="1">
-            <a:schemeClr val="accent2"/>
-          </a:lnRef>
-          <a:fillRef idx="2">
-            <a:schemeClr val="accent2"/>
-          </a:fillRef>
-          <a:effectRef idx="1">
-            <a:schemeClr val="accent2"/>
-          </a:effectRef>
-          <a:fontRef idx="minor">
-            <a:schemeClr val="dk1"/>
-          </a:fontRef>
-        </p:style>
-        <p:txBody>
-          <a:bodyPr rtlCol="0" anchor="ctr"/>
-          <a:lstStyle/>
-          <a:p>
-            <a:pPr algn="ctr"/>
-            <a:r>
-              <a:rPr lang="en-US" sz="1600" dirty="0">
+            <a:ln w="19050">
+              <a:solidFill>
+                <a:srgbClr val="C00000"/>
+              </a:solidFill>
+            </a:ln>
+            <a:effectLst/>
+          </p:spPr>
+          <p:style>
+            <a:lnRef idx="1">
+              <a:schemeClr val="accent2"/>
+            </a:lnRef>
+            <a:fillRef idx="2">
+              <a:schemeClr val="accent2"/>
+            </a:fillRef>
+            <a:effectRef idx="1">
+              <a:schemeClr val="accent2"/>
+            </a:effectRef>
+            <a:fontRef idx="minor">
+              <a:schemeClr val="dk1"/>
+            </a:fontRef>
+          </p:style>
+          <p:txBody>
+            <a:bodyPr rtlCol="0" anchor="ctr"/>
+            <a:lstStyle/>
+            <a:p>
+              <a:pPr algn="ctr"/>
+              <a:r>
+                <a:rPr lang="en-US" sz="1600" dirty="0">
+                  <a:solidFill>
+                    <a:schemeClr val="bg1"/>
+                  </a:solidFill>
+                </a:rPr>
+                <a:t>Main</a:t>
+              </a:r>
+              <a:endParaRPr lang="en-SG" sz="1600" dirty="0">
                 <a:solidFill>
                   <a:schemeClr val="bg1"/>
                 </a:solidFill>
-              </a:rPr>
-              <a:t>Main</a:t>
-            </a:r>
-            <a:endParaRPr lang="en-SG" sz="1600" dirty="0">
+              </a:endParaRPr>
+            </a:p>
+          </p:txBody>
+        </p:sp>
+        <p:cxnSp>
+          <p:nvCxnSpPr>
+            <p:cNvPr id="30" name="Straight Arrow Connector 29"/>
+            <p:cNvCxnSpPr/>
+            <p:nvPr/>
+          </p:nvCxnSpPr>
+          <p:spPr>
+            <a:xfrm>
+              <a:off x="4945047" y="3750994"/>
+              <a:ext cx="0" cy="381000"/>
+            </a:xfrm>
+            <a:prstGeom prst="straightConnector1">
+              <a:avLst/>
+            </a:prstGeom>
+            <a:ln w="28575">
               <a:solidFill>
-                <a:schemeClr val="bg1"/>
+                <a:schemeClr val="accent5">
+                  <a:lumMod val="75000"/>
+                </a:schemeClr>
               </a:solidFill>
-            </a:endParaRPr>
-          </a:p>
-        </p:txBody>
-      </p:sp>
-      <p:cxnSp>
-        <p:nvCxnSpPr>
-          <p:cNvPr id="30" name="Straight Arrow Connector 29"/>
-          <p:cNvCxnSpPr/>
-          <p:nvPr/>
-        </p:nvCxnSpPr>
-        <p:spPr>
-          <a:xfrm>
-            <a:off x="4945047" y="3750994"/>
-            <a:ext cx="0" cy="381000"/>
-          </a:xfrm>
-          <a:prstGeom prst="straightConnector1">
-            <a:avLst/>
-          </a:prstGeom>
-          <a:ln w="28575">
+              <a:prstDash val="sysDot"/>
+              <a:tailEnd type="arrow"/>
+            </a:ln>
+          </p:spPr>
+          <p:style>
+            <a:lnRef idx="1">
+              <a:schemeClr val="accent1"/>
+            </a:lnRef>
+            <a:fillRef idx="0">
+              <a:schemeClr val="accent1"/>
+            </a:fillRef>
+            <a:effectRef idx="0">
+              <a:schemeClr val="accent1"/>
+            </a:effectRef>
+            <a:fontRef idx="minor">
+              <a:schemeClr val="tx1"/>
+            </a:fontRef>
+          </p:style>
+        </p:cxnSp>
+        <p:cxnSp>
+          <p:nvCxnSpPr>
+            <p:cNvPr id="31" name="Straight Arrow Connector 30"/>
+            <p:cNvCxnSpPr/>
+            <p:nvPr/>
+          </p:nvCxnSpPr>
+          <p:spPr>
+            <a:xfrm>
+              <a:off x="5097447" y="3761908"/>
+              <a:ext cx="0" cy="381000"/>
+            </a:xfrm>
+            <a:prstGeom prst="straightConnector1">
+              <a:avLst/>
+            </a:prstGeom>
+            <a:ln w="28575">
+              <a:solidFill>
+                <a:schemeClr val="accent5">
+                  <a:lumMod val="75000"/>
+                </a:schemeClr>
+              </a:solidFill>
+              <a:prstDash val="sysDot"/>
+              <a:tailEnd type="arrow"/>
+            </a:ln>
+          </p:spPr>
+          <p:style>
+            <a:lnRef idx="1">
+              <a:schemeClr val="accent1"/>
+            </a:lnRef>
+            <a:fillRef idx="0">
+              <a:schemeClr val="accent1"/>
+            </a:fillRef>
+            <a:effectRef idx="0">
+              <a:schemeClr val="accent1"/>
+            </a:effectRef>
+            <a:fontRef idx="minor">
+              <a:schemeClr val="tx1"/>
+            </a:fontRef>
+          </p:style>
+        </p:cxnSp>
+        <p:cxnSp>
+          <p:nvCxnSpPr>
+            <p:cNvPr id="33" name="Straight Arrow Connector 32"/>
+            <p:cNvCxnSpPr/>
+            <p:nvPr/>
+          </p:nvCxnSpPr>
+          <p:spPr>
+            <a:xfrm>
+              <a:off x="5249847" y="3750994"/>
+              <a:ext cx="0" cy="381000"/>
+            </a:xfrm>
+            <a:prstGeom prst="straightConnector1">
+              <a:avLst/>
+            </a:prstGeom>
+            <a:ln w="28575">
+              <a:solidFill>
+                <a:schemeClr val="accent5">
+                  <a:lumMod val="75000"/>
+                </a:schemeClr>
+              </a:solidFill>
+              <a:prstDash val="sysDot"/>
+              <a:tailEnd type="arrow"/>
+            </a:ln>
+          </p:spPr>
+          <p:style>
+            <a:lnRef idx="1">
+              <a:schemeClr val="accent1"/>
+            </a:lnRef>
+            <a:fillRef idx="0">
+              <a:schemeClr val="accent1"/>
+            </a:fillRef>
+            <a:effectRef idx="0">
+              <a:schemeClr val="accent1"/>
+            </a:effectRef>
+            <a:fontRef idx="minor">
+              <a:schemeClr val="tx1"/>
+            </a:fontRef>
+          </p:style>
+        </p:cxnSp>
+        <p:cxnSp>
+          <p:nvCxnSpPr>
+            <p:cNvPr id="37" name="Straight Arrow Connector 36"/>
+            <p:cNvCxnSpPr>
+              <a:stCxn id="23" idx="1"/>
+            </p:cNvCxnSpPr>
+            <p:nvPr/>
+          </p:nvCxnSpPr>
+          <p:spPr>
+            <a:xfrm>
+              <a:off x="2743200" y="4244913"/>
+              <a:ext cx="249770" cy="0"/>
+            </a:xfrm>
+            <a:prstGeom prst="straightConnector1">
+              <a:avLst/>
+            </a:prstGeom>
+            <a:ln w="28575">
+              <a:solidFill>
+                <a:srgbClr val="C00000"/>
+              </a:solidFill>
+              <a:prstDash val="solid"/>
+              <a:tailEnd type="arrow"/>
+            </a:ln>
+          </p:spPr>
+          <p:style>
+            <a:lnRef idx="1">
+              <a:schemeClr val="accent1"/>
+            </a:lnRef>
+            <a:fillRef idx="0">
+              <a:schemeClr val="accent1"/>
+            </a:fillRef>
+            <a:effectRef idx="0">
+              <a:schemeClr val="accent1"/>
+            </a:effectRef>
+            <a:fontRef idx="minor">
+              <a:schemeClr val="tx1"/>
+            </a:fontRef>
+          </p:style>
+        </p:cxnSp>
+        <p:cxnSp>
+          <p:nvCxnSpPr>
+            <p:cNvPr id="38" name="Straight Arrow Connector 37"/>
+            <p:cNvCxnSpPr/>
+            <p:nvPr/>
+          </p:nvCxnSpPr>
+          <p:spPr>
+            <a:xfrm rot="13867188">
+              <a:off x="2743200" y="3755022"/>
+              <a:ext cx="0" cy="381000"/>
+            </a:xfrm>
+            <a:prstGeom prst="straightConnector1">
+              <a:avLst/>
+            </a:prstGeom>
+            <a:ln w="28575">
+              <a:solidFill>
+                <a:srgbClr val="C00000"/>
+              </a:solidFill>
+              <a:prstDash val="solid"/>
+              <a:tailEnd type="arrow"/>
+            </a:ln>
+          </p:spPr>
+          <p:style>
+            <a:lnRef idx="1">
+              <a:schemeClr val="accent1"/>
+            </a:lnRef>
+            <a:fillRef idx="0">
+              <a:schemeClr val="accent1"/>
+            </a:fillRef>
+            <a:effectRef idx="0">
+              <a:schemeClr val="accent1"/>
+            </a:effectRef>
+            <a:fontRef idx="minor">
+              <a:schemeClr val="tx1"/>
+            </a:fontRef>
+          </p:style>
+        </p:cxnSp>
+        <p:cxnSp>
+          <p:nvCxnSpPr>
+            <p:cNvPr id="39" name="Straight Arrow Connector 38"/>
+            <p:cNvCxnSpPr/>
+            <p:nvPr/>
+          </p:nvCxnSpPr>
+          <p:spPr>
+            <a:xfrm flipV="1">
+              <a:off x="2353734" y="3697061"/>
+              <a:ext cx="0" cy="301859"/>
+            </a:xfrm>
+            <a:prstGeom prst="straightConnector1">
+              <a:avLst/>
+            </a:prstGeom>
+            <a:ln w="28575">
+              <a:solidFill>
+                <a:srgbClr val="C00000"/>
+              </a:solidFill>
+              <a:prstDash val="solid"/>
+              <a:tailEnd type="arrow"/>
+            </a:ln>
+          </p:spPr>
+          <p:style>
+            <a:lnRef idx="1">
+              <a:schemeClr val="accent1"/>
+            </a:lnRef>
+            <a:fillRef idx="0">
+              <a:schemeClr val="accent1"/>
+            </a:fillRef>
+            <a:effectRef idx="0">
+              <a:schemeClr val="accent1"/>
+            </a:effectRef>
+            <a:fontRef idx="minor">
+              <a:schemeClr val="tx1"/>
+            </a:fontRef>
+          </p:style>
+        </p:cxnSp>
+        <p:sp>
+          <p:nvSpPr>
+            <p:cNvPr id="26" name="Oval 25"/>
+            <p:cNvSpPr/>
+            <p:nvPr/>
+          </p:nvSpPr>
+          <p:spPr>
+            <a:xfrm>
+              <a:off x="5888569" y="3515641"/>
+              <a:ext cx="1219201" cy="533400"/>
+            </a:xfrm>
+            <a:prstGeom prst="ellipse">
+              <a:avLst/>
+            </a:prstGeom>
             <a:solidFill>
               <a:schemeClr val="accent5">
                 <a:lumMod val="75000"/>
               </a:schemeClr>
             </a:solidFill>
-            <a:prstDash val="sysDot"/>
-            <a:tailEnd type="arrow"/>
-          </a:ln>
-        </p:spPr>
-        <p:style>
-          <a:lnRef idx="1">
-            <a:schemeClr val="accent1"/>
-          </a:lnRef>
-          <a:fillRef idx="0">
-            <a:schemeClr val="accent1"/>
-          </a:fillRef>
-          <a:effectRef idx="0">
-            <a:schemeClr val="accent1"/>
-          </a:effectRef>
-          <a:fontRef idx="minor">
-            <a:schemeClr val="tx1"/>
-          </a:fontRef>
-        </p:style>
-      </p:cxnSp>
-      <p:cxnSp>
-        <p:nvCxnSpPr>
-          <p:cNvPr id="31" name="Straight Arrow Connector 30"/>
-          <p:cNvCxnSpPr/>
-          <p:nvPr/>
-        </p:nvCxnSpPr>
-        <p:spPr>
-          <a:xfrm>
-            <a:off x="5097447" y="3761908"/>
-            <a:ext cx="0" cy="381000"/>
-          </a:xfrm>
-          <a:prstGeom prst="straightConnector1">
-            <a:avLst/>
-          </a:prstGeom>
-          <a:ln w="28575">
-            <a:solidFill>
-              <a:schemeClr val="accent5">
-                <a:lumMod val="75000"/>
-              </a:schemeClr>
-            </a:solidFill>
-            <a:prstDash val="sysDot"/>
-            <a:tailEnd type="arrow"/>
-          </a:ln>
-        </p:spPr>
-        <p:style>
-          <a:lnRef idx="1">
-            <a:schemeClr val="accent1"/>
-          </a:lnRef>
-          <a:fillRef idx="0">
-            <a:schemeClr val="accent1"/>
-          </a:fillRef>
-          <a:effectRef idx="0">
-            <a:schemeClr val="accent1"/>
-          </a:effectRef>
-          <a:fontRef idx="minor">
-            <a:schemeClr val="tx1"/>
-          </a:fontRef>
-        </p:style>
-      </p:cxnSp>
-      <p:cxnSp>
-        <p:nvCxnSpPr>
-          <p:cNvPr id="33" name="Straight Arrow Connector 32"/>
-          <p:cNvCxnSpPr/>
-          <p:nvPr/>
-        </p:nvCxnSpPr>
-        <p:spPr>
-          <a:xfrm>
-            <a:off x="5249847" y="3750994"/>
-            <a:ext cx="0" cy="381000"/>
-          </a:xfrm>
-          <a:prstGeom prst="straightConnector1">
-            <a:avLst/>
-          </a:prstGeom>
-          <a:ln w="28575">
-            <a:solidFill>
-              <a:schemeClr val="accent5">
-                <a:lumMod val="75000"/>
-              </a:schemeClr>
-            </a:solidFill>
-            <a:prstDash val="sysDot"/>
-            <a:tailEnd type="arrow"/>
-          </a:ln>
-        </p:spPr>
-        <p:style>
-          <a:lnRef idx="1">
-            <a:schemeClr val="accent1"/>
-          </a:lnRef>
-          <a:fillRef idx="0">
-            <a:schemeClr val="accent1"/>
-          </a:fillRef>
-          <a:effectRef idx="0">
-            <a:schemeClr val="accent1"/>
-          </a:effectRef>
-          <a:fontRef idx="minor">
-            <a:schemeClr val="tx1"/>
-          </a:fontRef>
-        </p:style>
-      </p:cxnSp>
-      <p:cxnSp>
-        <p:nvCxnSpPr>
-          <p:cNvPr id="37" name="Straight Arrow Connector 36"/>
-          <p:cNvCxnSpPr>
-            <a:stCxn id="23" idx="1"/>
-          </p:cNvCxnSpPr>
-          <p:nvPr/>
-        </p:nvCxnSpPr>
-        <p:spPr>
-          <a:xfrm>
-            <a:off x="2743200" y="4244913"/>
-            <a:ext cx="249770" cy="0"/>
-          </a:xfrm>
-          <a:prstGeom prst="straightConnector1">
-            <a:avLst/>
-          </a:prstGeom>
-          <a:ln w="28575">
-            <a:solidFill>
-              <a:srgbClr val="C00000"/>
-            </a:solidFill>
-            <a:prstDash val="solid"/>
-            <a:tailEnd type="arrow"/>
-          </a:ln>
-        </p:spPr>
-        <p:style>
-          <a:lnRef idx="1">
-            <a:schemeClr val="accent1"/>
-          </a:lnRef>
-          <a:fillRef idx="0">
-            <a:schemeClr val="accent1"/>
-          </a:fillRef>
-          <a:effectRef idx="0">
-            <a:schemeClr val="accent1"/>
-          </a:effectRef>
-          <a:fontRef idx="minor">
-            <a:schemeClr val="tx1"/>
-          </a:fontRef>
-        </p:style>
-      </p:cxnSp>
-      <p:cxnSp>
-        <p:nvCxnSpPr>
-          <p:cNvPr id="38" name="Straight Arrow Connector 37"/>
-          <p:cNvCxnSpPr/>
-          <p:nvPr/>
-        </p:nvCxnSpPr>
-        <p:spPr>
-          <a:xfrm rot="13867188">
-            <a:off x="2743200" y="3755022"/>
-            <a:ext cx="0" cy="381000"/>
-          </a:xfrm>
-          <a:prstGeom prst="straightConnector1">
-            <a:avLst/>
-          </a:prstGeom>
-          <a:ln w="28575">
-            <a:solidFill>
-              <a:srgbClr val="C00000"/>
-            </a:solidFill>
-            <a:prstDash val="solid"/>
-            <a:tailEnd type="arrow"/>
-          </a:ln>
-        </p:spPr>
-        <p:style>
-          <a:lnRef idx="1">
-            <a:schemeClr val="accent1"/>
-          </a:lnRef>
-          <a:fillRef idx="0">
-            <a:schemeClr val="accent1"/>
-          </a:fillRef>
-          <a:effectRef idx="0">
-            <a:schemeClr val="accent1"/>
-          </a:effectRef>
-          <a:fontRef idx="minor">
-            <a:schemeClr val="tx1"/>
-          </a:fontRef>
-        </p:style>
-      </p:cxnSp>
-      <p:cxnSp>
-        <p:nvCxnSpPr>
-          <p:cNvPr id="39" name="Straight Arrow Connector 38"/>
-          <p:cNvCxnSpPr/>
-          <p:nvPr/>
-        </p:nvCxnSpPr>
-        <p:spPr>
-          <a:xfrm flipV="1">
-            <a:off x="2353734" y="3697061"/>
-            <a:ext cx="0" cy="301859"/>
-          </a:xfrm>
-          <a:prstGeom prst="straightConnector1">
-            <a:avLst/>
-          </a:prstGeom>
-          <a:ln w="28575">
-            <a:solidFill>
-              <a:srgbClr val="C00000"/>
-            </a:solidFill>
-            <a:prstDash val="solid"/>
-            <a:tailEnd type="arrow"/>
-          </a:ln>
-        </p:spPr>
-        <p:style>
-          <a:lnRef idx="1">
-            <a:schemeClr val="accent1"/>
-          </a:lnRef>
-          <a:fillRef idx="0">
-            <a:schemeClr val="accent1"/>
-          </a:fillRef>
-          <a:effectRef idx="0">
-            <a:schemeClr val="accent1"/>
-          </a:effectRef>
-          <a:fontRef idx="minor">
-            <a:schemeClr val="tx1"/>
-          </a:fontRef>
-        </p:style>
-      </p:cxnSp>
-      <p:sp>
-        <p:nvSpPr>
-          <p:cNvPr id="26" name="Oval 25"/>
-          <p:cNvSpPr/>
-          <p:nvPr/>
-        </p:nvSpPr>
-        <p:spPr>
-          <a:xfrm>
-            <a:off x="5888569" y="3515641"/>
-            <a:ext cx="1219201" cy="533400"/>
-          </a:xfrm>
-          <a:prstGeom prst="ellipse">
-            <a:avLst/>
-          </a:prstGeom>
-          <a:solidFill>
-            <a:schemeClr val="accent5">
-              <a:lumMod val="75000"/>
-            </a:schemeClr>
-          </a:solidFill>
-          <a:ln w="19050">
-            <a:solidFill>
-              <a:schemeClr val="accent5">
-                <a:lumMod val="75000"/>
-              </a:schemeClr>
-            </a:solidFill>
-          </a:ln>
-          <a:effectLst/>
-        </p:spPr>
-        <p:style>
-          <a:lnRef idx="1">
-            <a:schemeClr val="accent5"/>
-          </a:lnRef>
-          <a:fillRef idx="2">
-            <a:schemeClr val="accent5"/>
-          </a:fillRef>
-          <a:effectRef idx="1">
-            <a:schemeClr val="accent5"/>
-          </a:effectRef>
-          <a:fontRef idx="minor">
-            <a:schemeClr val="dk1"/>
-          </a:fontRef>
-        </p:style>
-        <p:txBody>
-          <a:bodyPr rtlCol="0" anchor="ctr"/>
-          <a:lstStyle/>
-          <a:p>
-            <a:pPr algn="ctr"/>
-            <a:r>
-              <a:rPr lang="en-US" sz="1600" dirty="0">
-                <a:solidFill>
-                  <a:schemeClr val="bg1"/>
-                </a:solidFill>
-              </a:rPr>
-              <a:t>Logs</a:t>
-            </a:r>
-            <a:br>
-              <a:rPr lang="en-US" sz="1600" dirty="0">
-                <a:solidFill>
-                  <a:schemeClr val="bg1"/>
-                </a:solidFill>
-              </a:rPr>
-            </a:br>
-            <a:r>
-              <a:rPr lang="en-US" sz="1600" dirty="0">
-                <a:solidFill>
-                  <a:schemeClr val="bg1"/>
-                </a:solidFill>
-              </a:rPr>
-              <a:t>Center</a:t>
-            </a:r>
-          </a:p>
-        </p:txBody>
-      </p:sp>
-      <p:cxnSp>
-        <p:nvCxnSpPr>
-          <p:cNvPr id="40" name="Elbow Connector 39"/>
-          <p:cNvCxnSpPr>
-            <a:stCxn id="26" idx="4"/>
-            <a:endCxn id="8" idx="3"/>
-          </p:cNvCxnSpPr>
-          <p:nvPr/>
-        </p:nvCxnSpPr>
-        <p:spPr>
-          <a:xfrm rot="5400000">
-            <a:off x="6034638" y="3890781"/>
-            <a:ext cx="305273" cy="621793"/>
-          </a:xfrm>
-          <a:prstGeom prst="bentConnector2">
-            <a:avLst/>
-          </a:prstGeom>
-          <a:ln w="28575">
-            <a:solidFill>
-              <a:schemeClr val="accent5">
-                <a:lumMod val="75000"/>
-              </a:schemeClr>
-            </a:solidFill>
-          </a:ln>
-        </p:spPr>
-        <p:style>
-          <a:lnRef idx="1">
-            <a:schemeClr val="accent1"/>
-          </a:lnRef>
-          <a:fillRef idx="0">
-            <a:schemeClr val="accent1"/>
-          </a:fillRef>
-          <a:effectRef idx="0">
-            <a:schemeClr val="accent1"/>
-          </a:effectRef>
-          <a:fontRef idx="minor">
-            <a:schemeClr val="tx1"/>
-          </a:fontRef>
-        </p:style>
-      </p:cxnSp>
+            <a:ln w="19050">
+              <a:solidFill>
+                <a:schemeClr val="accent5">
+                  <a:lumMod val="75000"/>
+                </a:schemeClr>
+              </a:solidFill>
+            </a:ln>
+            <a:effectLst/>
+          </p:spPr>
+          <p:style>
+            <a:lnRef idx="1">
+              <a:schemeClr val="accent5"/>
+            </a:lnRef>
+            <a:fillRef idx="2">
+              <a:schemeClr val="accent5"/>
+            </a:fillRef>
+            <a:effectRef idx="1">
+              <a:schemeClr val="accent5"/>
+            </a:effectRef>
+            <a:fontRef idx="minor">
+              <a:schemeClr val="dk1"/>
+            </a:fontRef>
+          </p:style>
+          <p:txBody>
+            <a:bodyPr rtlCol="0" anchor="ctr"/>
+            <a:lstStyle/>
+            <a:p>
+              <a:pPr algn="ctr"/>
+              <a:r>
+                <a:rPr lang="en-US" sz="1600" dirty="0">
+                  <a:solidFill>
+                    <a:schemeClr val="bg1"/>
+                  </a:solidFill>
+                </a:rPr>
+                <a:t>Logs</a:t>
+              </a:r>
+              <a:br>
+                <a:rPr lang="en-US" sz="1600" dirty="0">
+                  <a:solidFill>
+                    <a:schemeClr val="bg1"/>
+                  </a:solidFill>
+                </a:rPr>
+              </a:br>
+              <a:r>
+                <a:rPr lang="en-US" sz="1600" dirty="0">
+                  <a:solidFill>
+                    <a:schemeClr val="bg1"/>
+                  </a:solidFill>
+                </a:rPr>
+                <a:t>Center</a:t>
+              </a:r>
+            </a:p>
+          </p:txBody>
+        </p:sp>
+        <p:cxnSp>
+          <p:nvCxnSpPr>
+            <p:cNvPr id="40" name="Elbow Connector 39"/>
+            <p:cNvCxnSpPr>
+              <a:stCxn id="26" idx="4"/>
+              <a:endCxn id="8" idx="3"/>
+            </p:cNvCxnSpPr>
+            <p:nvPr/>
+          </p:nvCxnSpPr>
+          <p:spPr>
+            <a:xfrm rot="5400000">
+              <a:off x="6034638" y="3890781"/>
+              <a:ext cx="305273" cy="621793"/>
+            </a:xfrm>
+            <a:prstGeom prst="bentConnector2">
+              <a:avLst/>
+            </a:prstGeom>
+            <a:ln w="28575">
+              <a:solidFill>
+                <a:schemeClr val="accent5">
+                  <a:lumMod val="75000"/>
+                </a:schemeClr>
+              </a:solidFill>
+            </a:ln>
+          </p:spPr>
+          <p:style>
+            <a:lnRef idx="1">
+              <a:schemeClr val="accent1"/>
+            </a:lnRef>
+            <a:fillRef idx="0">
+              <a:schemeClr val="accent1"/>
+            </a:fillRef>
+            <a:effectRef idx="0">
+              <a:schemeClr val="accent1"/>
+            </a:effectRef>
+            <a:fontRef idx="minor">
+              <a:schemeClr val="tx1"/>
+            </a:fontRef>
+          </p:style>
+        </p:cxnSp>
+      </p:grpSp>
     </p:spTree>
     <p:extLst>
       <p:ext uri="{BB962C8B-B14F-4D97-AF65-F5344CB8AC3E}">

</xml_diff>